<commit_message>
Update unit test and version number for new slide deck template
</commit_message>
<xml_diff>
--- a/inst/templates/TemplateDefault_169.pptx
+++ b/inst/templates/TemplateDefault_169.pptx
@@ -267,7 +267,7 @@
           <a:p>
             <a:fld id="{7B272C57-2FA0-4A9D-99A4-6F756B65018B}" type="datetimeFigureOut">
               <a:rPr lang="en-US" smtClean="0"/>
-              <a:t>1/7/2022</a:t>
+              <a:t>5/17/2022</a:t>
             </a:fld>
             <a:endParaRPr lang="en-US"/>
           </a:p>
@@ -341,6 +341,380 @@
 </file>
 
 <file path=ppt/slideLayouts/slideLayout10.xml><?xml version="1.0" encoding="utf-8"?>
+<p:sldLayout xmlns:a="http://schemas.openxmlformats.org/drawingml/2006/main" xmlns:r="http://schemas.openxmlformats.org/officeDocument/2006/relationships" xmlns:p="http://schemas.openxmlformats.org/presentationml/2006/main" preserve="1" userDrawn="1">
+  <p:cSld name="Two Content and Caption Left">
+    <p:bg>
+      <p:bgPr>
+        <a:solidFill>
+          <a:schemeClr val="bg1"/>
+        </a:solidFill>
+        <a:effectLst/>
+      </p:bgPr>
+    </p:bg>
+    <p:spTree>
+      <p:nvGrpSpPr>
+        <p:cNvPr id="1" name=""/>
+        <p:cNvGrpSpPr/>
+        <p:nvPr/>
+      </p:nvGrpSpPr>
+      <p:grpSpPr>
+        <a:xfrm>
+          <a:off x="0" y="0"/>
+          <a:ext cx="0" cy="0"/>
+          <a:chOff x="0" y="0"/>
+          <a:chExt cx="0" cy="0"/>
+        </a:xfrm>
+      </p:grpSpPr>
+      <p:sp>
+        <p:nvSpPr>
+          <p:cNvPr id="5" name="Date Placeholder 4">
+            <a:extLst>
+              <a:ext uri="{FF2B5EF4-FFF2-40B4-BE49-F238E27FC236}">
+                <a16:creationId xmlns:a16="http://schemas.microsoft.com/office/drawing/2014/main" id="{985F3433-3055-4279-A232-CDB35C481677}"/>
+              </a:ext>
+            </a:extLst>
+          </p:cNvPr>
+          <p:cNvSpPr>
+            <a:spLocks noGrp="1"/>
+          </p:cNvSpPr>
+          <p:nvPr>
+            <p:ph type="dt" sz="half" idx="10"/>
+          </p:nvPr>
+        </p:nvSpPr>
+        <p:spPr/>
+        <p:txBody>
+          <a:bodyPr/>
+          <a:lstStyle/>
+          <a:p>
+            <a:fld id="{7B272C57-2FA0-4A9D-99A4-6F756B65018B}" type="datetimeFigureOut">
+              <a:rPr lang="en-US" smtClean="0"/>
+              <a:t>5/17/2022</a:t>
+            </a:fld>
+            <a:endParaRPr lang="en-US"/>
+          </a:p>
+        </p:txBody>
+      </p:sp>
+      <p:sp>
+        <p:nvSpPr>
+          <p:cNvPr id="6" name="Footer Placeholder 5">
+            <a:extLst>
+              <a:ext uri="{FF2B5EF4-FFF2-40B4-BE49-F238E27FC236}">
+                <a16:creationId xmlns:a16="http://schemas.microsoft.com/office/drawing/2014/main" id="{C4190A63-5D67-4FD5-97FD-79F7445B6A2E}"/>
+              </a:ext>
+            </a:extLst>
+          </p:cNvPr>
+          <p:cNvSpPr>
+            <a:spLocks noGrp="1"/>
+          </p:cNvSpPr>
+          <p:nvPr>
+            <p:ph type="ftr" sz="quarter" idx="11"/>
+          </p:nvPr>
+        </p:nvSpPr>
+        <p:spPr/>
+        <p:txBody>
+          <a:bodyPr/>
+          <a:lstStyle/>
+          <a:p>
+            <a:endParaRPr lang="en-US"/>
+          </a:p>
+        </p:txBody>
+      </p:sp>
+      <p:sp>
+        <p:nvSpPr>
+          <p:cNvPr id="7" name="Slide Number Placeholder 6">
+            <a:extLst>
+              <a:ext uri="{FF2B5EF4-FFF2-40B4-BE49-F238E27FC236}">
+                <a16:creationId xmlns:a16="http://schemas.microsoft.com/office/drawing/2014/main" id="{D2687DAE-A442-4DC3-8550-20F58B781EC7}"/>
+              </a:ext>
+            </a:extLst>
+          </p:cNvPr>
+          <p:cNvSpPr>
+            <a:spLocks noGrp="1"/>
+          </p:cNvSpPr>
+          <p:nvPr>
+            <p:ph type="sldNum" sz="quarter" idx="12"/>
+          </p:nvPr>
+        </p:nvSpPr>
+        <p:spPr/>
+        <p:txBody>
+          <a:bodyPr/>
+          <a:lstStyle/>
+          <a:p>
+            <a:fld id="{C064A79B-B315-413E-88BB-EFE0B5D603D0}" type="slidenum">
+              <a:rPr lang="en-US" smtClean="0"/>
+              <a:t>‹#›</a:t>
+            </a:fld>
+            <a:endParaRPr lang="en-US"/>
+          </a:p>
+        </p:txBody>
+      </p:sp>
+      <p:sp>
+        <p:nvSpPr>
+          <p:cNvPr id="9" name="Title 1">
+            <a:extLst>
+              <a:ext uri="{FF2B5EF4-FFF2-40B4-BE49-F238E27FC236}">
+                <a16:creationId xmlns:a16="http://schemas.microsoft.com/office/drawing/2014/main" id="{177E17F1-D3B2-42A6-9982-8788655386CF}"/>
+              </a:ext>
+            </a:extLst>
+          </p:cNvPr>
+          <p:cNvSpPr>
+            <a:spLocks noGrp="1"/>
+          </p:cNvSpPr>
+          <p:nvPr>
+            <p:ph type="title"/>
+          </p:nvPr>
+        </p:nvSpPr>
+        <p:spPr>
+          <a:xfrm>
+            <a:off x="0" y="0"/>
+            <a:ext cx="12192000" cy="1013635"/>
+          </a:xfrm>
+          <a:solidFill>
+            <a:srgbClr val="2E3640"/>
+          </a:solidFill>
+        </p:spPr>
+        <p:txBody>
+          <a:bodyPr/>
+          <a:lstStyle>
+            <a:lvl1pPr>
+              <a:defRPr lang="en-US" dirty="0"/>
+            </a:lvl1pPr>
+          </a:lstStyle>
+          <a:p>
+            <a:r>
+              <a:rPr lang="en-US" dirty="0"/>
+              <a:t>Click to edit Master title style</a:t>
+            </a:r>
+          </a:p>
+        </p:txBody>
+      </p:sp>
+      <p:sp>
+        <p:nvSpPr>
+          <p:cNvPr id="10" name="Content Placeholder 2">
+            <a:extLst>
+              <a:ext uri="{FF2B5EF4-FFF2-40B4-BE49-F238E27FC236}">
+                <a16:creationId xmlns:a16="http://schemas.microsoft.com/office/drawing/2014/main" id="{F1A58CC4-526C-4991-898F-C0879D5343E8}"/>
+              </a:ext>
+            </a:extLst>
+          </p:cNvPr>
+          <p:cNvSpPr>
+            <a:spLocks noGrp="1"/>
+          </p:cNvSpPr>
+          <p:nvPr>
+            <p:ph sz="half" idx="1"/>
+          </p:nvPr>
+        </p:nvSpPr>
+        <p:spPr>
+          <a:xfrm>
+            <a:off x="250521" y="1205547"/>
+            <a:ext cx="5769279" cy="4446906"/>
+          </a:xfrm>
+        </p:spPr>
+        <p:txBody>
+          <a:bodyPr/>
+          <a:lstStyle/>
+          <a:p>
+            <a:pPr lvl="0"/>
+            <a:r>
+              <a:rPr lang="en-US"/>
+              <a:t>Click to edit Master text styles</a:t>
+            </a:r>
+          </a:p>
+          <a:p>
+            <a:pPr lvl="1"/>
+            <a:r>
+              <a:rPr lang="en-US"/>
+              <a:t>Second level</a:t>
+            </a:r>
+          </a:p>
+          <a:p>
+            <a:pPr lvl="2"/>
+            <a:r>
+              <a:rPr lang="en-US"/>
+              <a:t>Third level</a:t>
+            </a:r>
+          </a:p>
+          <a:p>
+            <a:pPr lvl="3"/>
+            <a:r>
+              <a:rPr lang="en-US"/>
+              <a:t>Fourth level</a:t>
+            </a:r>
+          </a:p>
+          <a:p>
+            <a:pPr lvl="4"/>
+            <a:r>
+              <a:rPr lang="en-US"/>
+              <a:t>Fifth level</a:t>
+            </a:r>
+          </a:p>
+        </p:txBody>
+      </p:sp>
+      <p:sp>
+        <p:nvSpPr>
+          <p:cNvPr id="11" name="Content Placeholder 3">
+            <a:extLst>
+              <a:ext uri="{FF2B5EF4-FFF2-40B4-BE49-F238E27FC236}">
+                <a16:creationId xmlns:a16="http://schemas.microsoft.com/office/drawing/2014/main" id="{CB008E43-F727-4C47-9855-9440A412ACCB}"/>
+              </a:ext>
+            </a:extLst>
+          </p:cNvPr>
+          <p:cNvSpPr>
+            <a:spLocks noGrp="1"/>
+          </p:cNvSpPr>
+          <p:nvPr>
+            <p:ph sz="half" idx="2"/>
+          </p:nvPr>
+        </p:nvSpPr>
+        <p:spPr>
+          <a:xfrm>
+            <a:off x="6172199" y="1205548"/>
+            <a:ext cx="5727527" cy="5021670"/>
+          </a:xfrm>
+        </p:spPr>
+        <p:txBody>
+          <a:bodyPr/>
+          <a:lstStyle/>
+          <a:p>
+            <a:pPr lvl="0"/>
+            <a:r>
+              <a:rPr lang="en-US"/>
+              <a:t>Click to edit Master text styles</a:t>
+            </a:r>
+          </a:p>
+          <a:p>
+            <a:pPr lvl="1"/>
+            <a:r>
+              <a:rPr lang="en-US"/>
+              <a:t>Second level</a:t>
+            </a:r>
+          </a:p>
+          <a:p>
+            <a:pPr lvl="2"/>
+            <a:r>
+              <a:rPr lang="en-US"/>
+              <a:t>Third level</a:t>
+            </a:r>
+          </a:p>
+          <a:p>
+            <a:pPr lvl="3"/>
+            <a:r>
+              <a:rPr lang="en-US"/>
+              <a:t>Fourth level</a:t>
+            </a:r>
+          </a:p>
+          <a:p>
+            <a:pPr lvl="4"/>
+            <a:r>
+              <a:rPr lang="en-US"/>
+              <a:t>Fifth level</a:t>
+            </a:r>
+          </a:p>
+        </p:txBody>
+      </p:sp>
+      <p:sp>
+        <p:nvSpPr>
+          <p:cNvPr id="3" name="Text Placeholder 2">
+            <a:extLst>
+              <a:ext uri="{FF2B5EF4-FFF2-40B4-BE49-F238E27FC236}">
+                <a16:creationId xmlns:a16="http://schemas.microsoft.com/office/drawing/2014/main" id="{B6810FF5-0B9C-4441-B73D-B10146FB8996}"/>
+              </a:ext>
+            </a:extLst>
+          </p:cNvPr>
+          <p:cNvSpPr>
+            <a:spLocks noGrp="1"/>
+          </p:cNvSpPr>
+          <p:nvPr>
+            <p:ph type="body" sz="quarter" idx="13"/>
+          </p:nvPr>
+        </p:nvSpPr>
+        <p:spPr>
+          <a:xfrm>
+            <a:off x="250521" y="5781584"/>
+            <a:ext cx="5769279" cy="445634"/>
+          </a:xfrm>
+        </p:spPr>
+        <p:txBody>
+          <a:bodyPr/>
+          <a:lstStyle>
+            <a:lvl1pPr marL="0" indent="0">
+              <a:buFont typeface="Arial" panose="020B0604020202020204" pitchFamily="34" charset="0"/>
+              <a:buNone/>
+              <a:defRPr sz="1200"/>
+            </a:lvl1pPr>
+            <a:lvl2pPr marL="457200" indent="0">
+              <a:buFont typeface="Arial" panose="020B0604020202020204" pitchFamily="34" charset="0"/>
+              <a:buNone/>
+              <a:defRPr sz="1100"/>
+            </a:lvl2pPr>
+            <a:lvl3pPr marL="914400" indent="0">
+              <a:buFont typeface="Arial" panose="020B0604020202020204" pitchFamily="34" charset="0"/>
+              <a:buNone/>
+              <a:defRPr sz="1050"/>
+            </a:lvl3pPr>
+            <a:lvl4pPr marL="1371600" indent="0">
+              <a:buFont typeface="Arial" panose="020B0604020202020204" pitchFamily="34" charset="0"/>
+              <a:buNone/>
+              <a:defRPr sz="1000"/>
+            </a:lvl4pPr>
+            <a:lvl5pPr marL="1828800" indent="0">
+              <a:buFont typeface="Arial" panose="020B0604020202020204" pitchFamily="34" charset="0"/>
+              <a:buNone/>
+              <a:defRPr sz="1000"/>
+            </a:lvl5pPr>
+          </a:lstStyle>
+          <a:p>
+            <a:pPr lvl="0"/>
+            <a:r>
+              <a:rPr lang="en-US" dirty="0"/>
+              <a:t>Click to edit Master text styles</a:t>
+            </a:r>
+          </a:p>
+          <a:p>
+            <a:pPr lvl="1"/>
+            <a:r>
+              <a:rPr lang="en-US" dirty="0"/>
+              <a:t>Second level</a:t>
+            </a:r>
+          </a:p>
+          <a:p>
+            <a:pPr lvl="2"/>
+            <a:r>
+              <a:rPr lang="en-US" dirty="0"/>
+              <a:t>Third level</a:t>
+            </a:r>
+          </a:p>
+          <a:p>
+            <a:pPr lvl="3"/>
+            <a:r>
+              <a:rPr lang="en-US" dirty="0"/>
+              <a:t>Fourth level</a:t>
+            </a:r>
+          </a:p>
+          <a:p>
+            <a:pPr lvl="4"/>
+            <a:r>
+              <a:rPr lang="en-US" dirty="0"/>
+              <a:t>Fifth level</a:t>
+            </a:r>
+            <a:endParaRPr lang="en-CH" dirty="0"/>
+          </a:p>
+        </p:txBody>
+      </p:sp>
+    </p:spTree>
+    <p:extLst>
+      <p:ext uri="{BB962C8B-B14F-4D97-AF65-F5344CB8AC3E}">
+        <p14:creationId xmlns:p14="http://schemas.microsoft.com/office/powerpoint/2010/main" val="3059227006"/>
+      </p:ext>
+    </p:extLst>
+  </p:cSld>
+  <p:clrMapOvr>
+    <a:masterClrMapping/>
+  </p:clrMapOvr>
+</p:sldLayout>
+</file>
+
+<file path=ppt/slideLayouts/slideLayout11.xml><?xml version="1.0" encoding="utf-8"?>
 <p:sldLayout xmlns:a="http://schemas.openxmlformats.org/drawingml/2006/main" xmlns:r="http://schemas.openxmlformats.org/officeDocument/2006/relationships" xmlns:p="http://schemas.openxmlformats.org/presentationml/2006/main" preserve="1" userDrawn="1">
   <p:cSld name="Two Content and Caption">
     <p:bg>
@@ -388,7 +762,7 @@
           <a:p>
             <a:fld id="{7B272C57-2FA0-4A9D-99A4-6F756B65018B}" type="datetimeFigureOut">
               <a:rPr lang="en-US" smtClean="0"/>
-              <a:t>1/7/2022</a:t>
+              <a:t>5/17/2022</a:t>
             </a:fld>
             <a:endParaRPr lang="en-US"/>
           </a:p>
@@ -805,7 +1179,7 @@
 </p:sldLayout>
 </file>
 
-<file path=ppt/slideLayouts/slideLayout11.xml><?xml version="1.0" encoding="utf-8"?>
+<file path=ppt/slideLayouts/slideLayout12.xml><?xml version="1.0" encoding="utf-8"?>
 <p:sldLayout xmlns:a="http://schemas.openxmlformats.org/drawingml/2006/main" xmlns:r="http://schemas.openxmlformats.org/officeDocument/2006/relationships" xmlns:p="http://schemas.openxmlformats.org/presentationml/2006/main" type="twoTxTwoObj" preserve="1">
   <p:cSld name="Comparison">
     <p:spTree>
@@ -1144,7 +1518,7 @@
           <a:p>
             <a:fld id="{7B272C57-2FA0-4A9D-99A4-6F756B65018B}" type="datetimeFigureOut">
               <a:rPr lang="en-US" smtClean="0"/>
-              <a:t>1/7/2022</a:t>
+              <a:t>5/17/2022</a:t>
             </a:fld>
             <a:endParaRPr lang="en-US"/>
           </a:p>
@@ -1217,7 +1591,7 @@
 </p:sldLayout>
 </file>
 
-<file path=ppt/slideLayouts/slideLayout12.xml><?xml version="1.0" encoding="utf-8"?>
+<file path=ppt/slideLayouts/slideLayout13.xml><?xml version="1.0" encoding="utf-8"?>
 <p:sldLayout xmlns:a="http://schemas.openxmlformats.org/drawingml/2006/main" xmlns:r="http://schemas.openxmlformats.org/officeDocument/2006/relationships" xmlns:p="http://schemas.openxmlformats.org/presentationml/2006/main" type="titleOnly" preserve="1">
   <p:cSld name="Title Only">
     <p:spTree>
@@ -1301,7 +1675,7 @@
           <a:p>
             <a:fld id="{7B272C57-2FA0-4A9D-99A4-6F756B65018B}" type="datetimeFigureOut">
               <a:rPr lang="en-US" smtClean="0"/>
-              <a:t>1/7/2022</a:t>
+              <a:t>5/17/2022</a:t>
             </a:fld>
             <a:endParaRPr lang="en-US"/>
           </a:p>
@@ -1374,7 +1748,7 @@
 </p:sldLayout>
 </file>
 
-<file path=ppt/slideLayouts/slideLayout13.xml><?xml version="1.0" encoding="utf-8"?>
+<file path=ppt/slideLayouts/slideLayout14.xml><?xml version="1.0" encoding="utf-8"?>
 <p:sldLayout xmlns:a="http://schemas.openxmlformats.org/drawingml/2006/main" xmlns:r="http://schemas.openxmlformats.org/officeDocument/2006/relationships" xmlns:p="http://schemas.openxmlformats.org/presentationml/2006/main" type="blank" preserve="1">
   <p:cSld name="Blank">
     <p:spTree>
@@ -1414,7 +1788,7 @@
           <a:p>
             <a:fld id="{7B272C57-2FA0-4A9D-99A4-6F756B65018B}" type="datetimeFigureOut">
               <a:rPr lang="en-US" smtClean="0"/>
-              <a:t>1/7/2022</a:t>
+              <a:t>5/17/2022</a:t>
             </a:fld>
             <a:endParaRPr lang="en-US"/>
           </a:p>
@@ -1487,7 +1861,7 @@
 </p:sldLayout>
 </file>
 
-<file path=ppt/slideLayouts/slideLayout14.xml><?xml version="1.0" encoding="utf-8"?>
+<file path=ppt/slideLayouts/slideLayout15.xml><?xml version="1.0" encoding="utf-8"?>
 <p:sldLayout xmlns:a="http://schemas.openxmlformats.org/drawingml/2006/main" xmlns:r="http://schemas.openxmlformats.org/officeDocument/2006/relationships" xmlns:p="http://schemas.openxmlformats.org/presentationml/2006/main" type="objTx" preserve="1">
   <p:cSld name="Content with Caption">
     <p:spTree>
@@ -1725,7 +2099,7 @@
           <a:p>
             <a:fld id="{7B272C57-2FA0-4A9D-99A4-6F756B65018B}" type="datetimeFigureOut">
               <a:rPr lang="en-US" smtClean="0"/>
-              <a:t>1/7/2022</a:t>
+              <a:t>5/17/2022</a:t>
             </a:fld>
             <a:endParaRPr lang="en-US"/>
           </a:p>
@@ -1798,7 +2172,7 @@
 </p:sldLayout>
 </file>
 
-<file path=ppt/slideLayouts/slideLayout15.xml><?xml version="1.0" encoding="utf-8"?>
+<file path=ppt/slideLayouts/slideLayout16.xml><?xml version="1.0" encoding="utf-8"?>
 <p:sldLayout xmlns:a="http://schemas.openxmlformats.org/drawingml/2006/main" xmlns:r="http://schemas.openxmlformats.org/officeDocument/2006/relationships" xmlns:p="http://schemas.openxmlformats.org/presentationml/2006/main" type="picTx" preserve="1">
   <p:cSld name="Picture with Caption">
     <p:spTree>
@@ -2013,7 +2387,7 @@
           <a:p>
             <a:fld id="{7B272C57-2FA0-4A9D-99A4-6F756B65018B}" type="datetimeFigureOut">
               <a:rPr lang="en-US" smtClean="0"/>
-              <a:t>1/7/2022</a:t>
+              <a:t>5/17/2022</a:t>
             </a:fld>
             <a:endParaRPr lang="en-US"/>
           </a:p>
@@ -2086,7 +2460,7 @@
 </p:sldLayout>
 </file>
 
-<file path=ppt/slideLayouts/slideLayout16.xml><?xml version="1.0" encoding="utf-8"?>
+<file path=ppt/slideLayouts/slideLayout17.xml><?xml version="1.0" encoding="utf-8"?>
 <p:sldLayout xmlns:a="http://schemas.openxmlformats.org/drawingml/2006/main" xmlns:r="http://schemas.openxmlformats.org/officeDocument/2006/relationships" xmlns:p="http://schemas.openxmlformats.org/presentationml/2006/main" type="vertTx" preserve="1">
   <p:cSld name="Title and Vertical Text">
     <p:spTree>
@@ -2211,7 +2585,7 @@
           <a:p>
             <a:fld id="{7B272C57-2FA0-4A9D-99A4-6F756B65018B}" type="datetimeFigureOut">
               <a:rPr lang="en-US" smtClean="0"/>
-              <a:t>1/7/2022</a:t>
+              <a:t>5/17/2022</a:t>
             </a:fld>
             <a:endParaRPr lang="en-US"/>
           </a:p>
@@ -2284,7 +2658,7 @@
 </p:sldLayout>
 </file>
 
-<file path=ppt/slideLayouts/slideLayout17.xml><?xml version="1.0" encoding="utf-8"?>
+<file path=ppt/slideLayouts/slideLayout18.xml><?xml version="1.0" encoding="utf-8"?>
 <p:sldLayout xmlns:a="http://schemas.openxmlformats.org/drawingml/2006/main" xmlns:r="http://schemas.openxmlformats.org/officeDocument/2006/relationships" xmlns:p="http://schemas.openxmlformats.org/presentationml/2006/main" type="vertTitleAndTx" preserve="1">
   <p:cSld name="Vertical Title and Text">
     <p:spTree>
@@ -2419,7 +2793,7 @@
           <a:p>
             <a:fld id="{7B272C57-2FA0-4A9D-99A4-6F756B65018B}" type="datetimeFigureOut">
               <a:rPr lang="en-US" smtClean="0"/>
-              <a:t>1/7/2022</a:t>
+              <a:t>5/17/2022</a:t>
             </a:fld>
             <a:endParaRPr lang="en-US"/>
           </a:p>
@@ -2622,7 +2996,7 @@
           <a:p>
             <a:fld id="{7B272C57-2FA0-4A9D-99A4-6F756B65018B}" type="datetimeFigureOut">
               <a:rPr lang="en-US" smtClean="0"/>
-              <a:t>1/7/2022</a:t>
+              <a:t>5/17/2022</a:t>
             </a:fld>
             <a:endParaRPr lang="en-US"/>
           </a:p>
@@ -2835,7 +3209,7 @@
           <a:p>
             <a:fld id="{7B272C57-2FA0-4A9D-99A4-6F756B65018B}" type="datetimeFigureOut">
               <a:rPr lang="en-US" smtClean="0"/>
-              <a:t>1/7/2022</a:t>
+              <a:t>5/17/2022</a:t>
             </a:fld>
             <a:endParaRPr lang="en-US" dirty="0"/>
           </a:p>
@@ -3108,7 +3482,7 @@
           <a:p>
             <a:fld id="{7B272C57-2FA0-4A9D-99A4-6F756B65018B}" type="datetimeFigureOut">
               <a:rPr lang="en-US" smtClean="0"/>
-              <a:t>1/7/2022</a:t>
+              <a:t>5/17/2022</a:t>
             </a:fld>
             <a:endParaRPr lang="en-US"/>
           </a:p>
@@ -3407,7 +3781,7 @@
           <a:p>
             <a:fld id="{7B272C57-2FA0-4A9D-99A4-6F756B65018B}" type="datetimeFigureOut">
               <a:rPr lang="en-US" smtClean="0"/>
-              <a:t>1/7/2022</a:t>
+              <a:t>5/17/2022</a:t>
             </a:fld>
             <a:endParaRPr lang="en-US"/>
           </a:p>
@@ -3833,7 +4207,7 @@
           <a:p>
             <a:fld id="{7B272C57-2FA0-4A9D-99A4-6F756B65018B}" type="datetimeFigureOut">
               <a:rPr lang="en-US" smtClean="0"/>
-              <a:t>1/7/2022</a:t>
+              <a:t>5/17/2022</a:t>
             </a:fld>
             <a:endParaRPr lang="en-US"/>
           </a:p>
@@ -3954,7 +4328,7 @@
           <a:p>
             <a:fld id="{7B272C57-2FA0-4A9D-99A4-6F756B65018B}" type="datetimeFigureOut">
               <a:rPr lang="en-US" smtClean="0"/>
-              <a:t>1/7/2022</a:t>
+              <a:t>5/17/2022</a:t>
             </a:fld>
             <a:endParaRPr lang="en-US"/>
           </a:p>
@@ -4192,6 +4566,309 @@
 </file>
 
 <file path=ppt/slideLayouts/slideLayout8.xml><?xml version="1.0" encoding="utf-8"?>
+<p:sldLayout xmlns:a="http://schemas.openxmlformats.org/drawingml/2006/main" xmlns:r="http://schemas.openxmlformats.org/officeDocument/2006/relationships" xmlns:p="http://schemas.openxmlformats.org/presentationml/2006/main" preserve="1" userDrawn="1">
+  <p:cSld name="Two Content Right Bigger">
+    <p:bg>
+      <p:bgPr>
+        <a:solidFill>
+          <a:schemeClr val="bg1"/>
+        </a:solidFill>
+        <a:effectLst/>
+      </p:bgPr>
+    </p:bg>
+    <p:spTree>
+      <p:nvGrpSpPr>
+        <p:cNvPr id="1" name=""/>
+        <p:cNvGrpSpPr/>
+        <p:nvPr/>
+      </p:nvGrpSpPr>
+      <p:grpSpPr>
+        <a:xfrm>
+          <a:off x="0" y="0"/>
+          <a:ext cx="0" cy="0"/>
+          <a:chOff x="0" y="0"/>
+          <a:chExt cx="0" cy="0"/>
+        </a:xfrm>
+      </p:grpSpPr>
+      <p:sp>
+        <p:nvSpPr>
+          <p:cNvPr id="5" name="Date Placeholder 4">
+            <a:extLst>
+              <a:ext uri="{FF2B5EF4-FFF2-40B4-BE49-F238E27FC236}">
+                <a16:creationId xmlns:a16="http://schemas.microsoft.com/office/drawing/2014/main" id="{985F3433-3055-4279-A232-CDB35C481677}"/>
+              </a:ext>
+            </a:extLst>
+          </p:cNvPr>
+          <p:cNvSpPr>
+            <a:spLocks noGrp="1"/>
+          </p:cNvSpPr>
+          <p:nvPr>
+            <p:ph type="dt" sz="half" idx="10"/>
+          </p:nvPr>
+        </p:nvSpPr>
+        <p:spPr/>
+        <p:txBody>
+          <a:bodyPr/>
+          <a:lstStyle/>
+          <a:p>
+            <a:fld id="{7B272C57-2FA0-4A9D-99A4-6F756B65018B}" type="datetimeFigureOut">
+              <a:rPr lang="en-US" smtClean="0"/>
+              <a:t>5/17/2022</a:t>
+            </a:fld>
+            <a:endParaRPr lang="en-US"/>
+          </a:p>
+        </p:txBody>
+      </p:sp>
+      <p:sp>
+        <p:nvSpPr>
+          <p:cNvPr id="6" name="Footer Placeholder 5">
+            <a:extLst>
+              <a:ext uri="{FF2B5EF4-FFF2-40B4-BE49-F238E27FC236}">
+                <a16:creationId xmlns:a16="http://schemas.microsoft.com/office/drawing/2014/main" id="{C4190A63-5D67-4FD5-97FD-79F7445B6A2E}"/>
+              </a:ext>
+            </a:extLst>
+          </p:cNvPr>
+          <p:cNvSpPr>
+            <a:spLocks noGrp="1"/>
+          </p:cNvSpPr>
+          <p:nvPr>
+            <p:ph type="ftr" sz="quarter" idx="11"/>
+          </p:nvPr>
+        </p:nvSpPr>
+        <p:spPr/>
+        <p:txBody>
+          <a:bodyPr/>
+          <a:lstStyle/>
+          <a:p>
+            <a:endParaRPr lang="en-US"/>
+          </a:p>
+        </p:txBody>
+      </p:sp>
+      <p:sp>
+        <p:nvSpPr>
+          <p:cNvPr id="7" name="Slide Number Placeholder 6">
+            <a:extLst>
+              <a:ext uri="{FF2B5EF4-FFF2-40B4-BE49-F238E27FC236}">
+                <a16:creationId xmlns:a16="http://schemas.microsoft.com/office/drawing/2014/main" id="{D2687DAE-A442-4DC3-8550-20F58B781EC7}"/>
+              </a:ext>
+            </a:extLst>
+          </p:cNvPr>
+          <p:cNvSpPr>
+            <a:spLocks noGrp="1"/>
+          </p:cNvSpPr>
+          <p:nvPr>
+            <p:ph type="sldNum" sz="quarter" idx="12"/>
+          </p:nvPr>
+        </p:nvSpPr>
+        <p:spPr/>
+        <p:txBody>
+          <a:bodyPr/>
+          <a:lstStyle/>
+          <a:p>
+            <a:fld id="{C064A79B-B315-413E-88BB-EFE0B5D603D0}" type="slidenum">
+              <a:rPr lang="en-US" smtClean="0"/>
+              <a:t>‹#›</a:t>
+            </a:fld>
+            <a:endParaRPr lang="en-US"/>
+          </a:p>
+        </p:txBody>
+      </p:sp>
+      <p:sp>
+        <p:nvSpPr>
+          <p:cNvPr id="9" name="Title 1">
+            <a:extLst>
+              <a:ext uri="{FF2B5EF4-FFF2-40B4-BE49-F238E27FC236}">
+                <a16:creationId xmlns:a16="http://schemas.microsoft.com/office/drawing/2014/main" id="{177E17F1-D3B2-42A6-9982-8788655386CF}"/>
+              </a:ext>
+            </a:extLst>
+          </p:cNvPr>
+          <p:cNvSpPr>
+            <a:spLocks noGrp="1"/>
+          </p:cNvSpPr>
+          <p:nvPr>
+            <p:ph type="title"/>
+          </p:nvPr>
+        </p:nvSpPr>
+        <p:spPr>
+          <a:xfrm>
+            <a:off x="0" y="0"/>
+            <a:ext cx="12192000" cy="1013635"/>
+          </a:xfrm>
+          <a:solidFill>
+            <a:srgbClr val="2E3640"/>
+          </a:solidFill>
+        </p:spPr>
+        <p:txBody>
+          <a:bodyPr/>
+          <a:lstStyle>
+            <a:lvl1pPr>
+              <a:defRPr lang="en-US" dirty="0"/>
+            </a:lvl1pPr>
+          </a:lstStyle>
+          <a:p>
+            <a:r>
+              <a:rPr lang="en-US" dirty="0"/>
+              <a:t>Click to edit Master title style</a:t>
+            </a:r>
+          </a:p>
+        </p:txBody>
+      </p:sp>
+      <p:sp>
+        <p:nvSpPr>
+          <p:cNvPr id="10" name="Content Placeholder 2">
+            <a:extLst>
+              <a:ext uri="{FF2B5EF4-FFF2-40B4-BE49-F238E27FC236}">
+                <a16:creationId xmlns:a16="http://schemas.microsoft.com/office/drawing/2014/main" id="{F1A58CC4-526C-4991-898F-C0879D5343E8}"/>
+              </a:ext>
+            </a:extLst>
+          </p:cNvPr>
+          <p:cNvSpPr>
+            <a:spLocks noGrp="1"/>
+          </p:cNvSpPr>
+          <p:nvPr>
+            <p:ph sz="half" idx="1"/>
+          </p:nvPr>
+        </p:nvSpPr>
+        <p:spPr>
+          <a:xfrm>
+            <a:off x="250521" y="1205547"/>
+            <a:ext cx="2893512" cy="4971416"/>
+          </a:xfrm>
+        </p:spPr>
+        <p:txBody>
+          <a:bodyPr>
+            <a:normAutofit/>
+          </a:bodyPr>
+          <a:lstStyle>
+            <a:lvl1pPr>
+              <a:defRPr sz="1600"/>
+            </a:lvl1pPr>
+            <a:lvl2pPr>
+              <a:defRPr sz="1400"/>
+            </a:lvl2pPr>
+            <a:lvl3pPr>
+              <a:defRPr sz="1200"/>
+            </a:lvl3pPr>
+            <a:lvl4pPr>
+              <a:defRPr sz="1100"/>
+            </a:lvl4pPr>
+            <a:lvl5pPr>
+              <a:defRPr sz="1100"/>
+            </a:lvl5pPr>
+          </a:lstStyle>
+          <a:p>
+            <a:pPr lvl="0"/>
+            <a:r>
+              <a:rPr lang="en-US" dirty="0"/>
+              <a:t>Click to edit Master text styles</a:t>
+            </a:r>
+          </a:p>
+          <a:p>
+            <a:pPr lvl="1"/>
+            <a:r>
+              <a:rPr lang="en-US" dirty="0"/>
+              <a:t>Second level</a:t>
+            </a:r>
+          </a:p>
+          <a:p>
+            <a:pPr lvl="2"/>
+            <a:r>
+              <a:rPr lang="en-US" dirty="0"/>
+              <a:t>Third level</a:t>
+            </a:r>
+          </a:p>
+          <a:p>
+            <a:pPr lvl="3"/>
+            <a:r>
+              <a:rPr lang="en-US" dirty="0"/>
+              <a:t>Fourth level</a:t>
+            </a:r>
+          </a:p>
+          <a:p>
+            <a:pPr lvl="4"/>
+            <a:r>
+              <a:rPr lang="en-US" dirty="0"/>
+              <a:t>Fifth level</a:t>
+            </a:r>
+          </a:p>
+        </p:txBody>
+      </p:sp>
+      <p:sp>
+        <p:nvSpPr>
+          <p:cNvPr id="11" name="Content Placeholder 3">
+            <a:extLst>
+              <a:ext uri="{FF2B5EF4-FFF2-40B4-BE49-F238E27FC236}">
+                <a16:creationId xmlns:a16="http://schemas.microsoft.com/office/drawing/2014/main" id="{CB008E43-F727-4C47-9855-9440A412ACCB}"/>
+              </a:ext>
+            </a:extLst>
+          </p:cNvPr>
+          <p:cNvSpPr>
+            <a:spLocks noGrp="1"/>
+          </p:cNvSpPr>
+          <p:nvPr>
+            <p:ph sz="half" idx="2"/>
+          </p:nvPr>
+        </p:nvSpPr>
+        <p:spPr>
+          <a:xfrm>
+            <a:off x="3144033" y="1205547"/>
+            <a:ext cx="8755694" cy="4971416"/>
+          </a:xfrm>
+        </p:spPr>
+        <p:txBody>
+          <a:bodyPr/>
+          <a:lstStyle/>
+          <a:p>
+            <a:pPr lvl="0"/>
+            <a:r>
+              <a:rPr lang="en-US" dirty="0"/>
+              <a:t>Click to edit Master text styles</a:t>
+            </a:r>
+          </a:p>
+          <a:p>
+            <a:pPr lvl="1"/>
+            <a:r>
+              <a:rPr lang="en-US" dirty="0"/>
+              <a:t>Second level</a:t>
+            </a:r>
+          </a:p>
+          <a:p>
+            <a:pPr lvl="2"/>
+            <a:r>
+              <a:rPr lang="en-US" dirty="0"/>
+              <a:t>Third level</a:t>
+            </a:r>
+          </a:p>
+          <a:p>
+            <a:pPr lvl="3"/>
+            <a:r>
+              <a:rPr lang="en-US" dirty="0"/>
+              <a:t>Fourth level</a:t>
+            </a:r>
+          </a:p>
+          <a:p>
+            <a:pPr lvl="4"/>
+            <a:r>
+              <a:rPr lang="en-US" dirty="0"/>
+              <a:t>Fifth level</a:t>
+            </a:r>
+          </a:p>
+        </p:txBody>
+      </p:sp>
+    </p:spTree>
+    <p:extLst>
+      <p:ext uri="{BB962C8B-B14F-4D97-AF65-F5344CB8AC3E}">
+        <p14:creationId xmlns:p14="http://schemas.microsoft.com/office/powerpoint/2010/main" val="3917603814"/>
+      </p:ext>
+    </p:extLst>
+  </p:cSld>
+  <p:clrMapOvr>
+    <a:masterClrMapping/>
+  </p:clrMapOvr>
+</p:sldLayout>
+</file>
+
+<file path=ppt/slideLayouts/slideLayout9.xml><?xml version="1.0" encoding="utf-8"?>
 <p:sldLayout xmlns:a="http://schemas.openxmlformats.org/drawingml/2006/main" xmlns:r="http://schemas.openxmlformats.org/officeDocument/2006/relationships" xmlns:p="http://schemas.openxmlformats.org/presentationml/2006/main" preserve="1" userDrawn="1">
   <p:cSld name="Two Content and Caption Right">
     <p:bg>
@@ -4239,7 +4916,7 @@
           <a:p>
             <a:fld id="{7B272C57-2FA0-4A9D-99A4-6F756B65018B}" type="datetimeFigureOut">
               <a:rPr lang="en-US" smtClean="0"/>
-              <a:t>1/7/2022</a:t>
+              <a:t>5/17/2022</a:t>
             </a:fld>
             <a:endParaRPr lang="en-US"/>
           </a:p>
@@ -4556,380 +5233,6 @@
     <p:extLst>
       <p:ext uri="{BB962C8B-B14F-4D97-AF65-F5344CB8AC3E}">
         <p14:creationId xmlns:p14="http://schemas.microsoft.com/office/powerpoint/2010/main" val="3584477701"/>
-      </p:ext>
-    </p:extLst>
-  </p:cSld>
-  <p:clrMapOvr>
-    <a:masterClrMapping/>
-  </p:clrMapOvr>
-</p:sldLayout>
-</file>
-
-<file path=ppt/slideLayouts/slideLayout9.xml><?xml version="1.0" encoding="utf-8"?>
-<p:sldLayout xmlns:a="http://schemas.openxmlformats.org/drawingml/2006/main" xmlns:r="http://schemas.openxmlformats.org/officeDocument/2006/relationships" xmlns:p="http://schemas.openxmlformats.org/presentationml/2006/main" preserve="1" userDrawn="1">
-  <p:cSld name="Two Content and Caption Left">
-    <p:bg>
-      <p:bgPr>
-        <a:solidFill>
-          <a:schemeClr val="bg1"/>
-        </a:solidFill>
-        <a:effectLst/>
-      </p:bgPr>
-    </p:bg>
-    <p:spTree>
-      <p:nvGrpSpPr>
-        <p:cNvPr id="1" name=""/>
-        <p:cNvGrpSpPr/>
-        <p:nvPr/>
-      </p:nvGrpSpPr>
-      <p:grpSpPr>
-        <a:xfrm>
-          <a:off x="0" y="0"/>
-          <a:ext cx="0" cy="0"/>
-          <a:chOff x="0" y="0"/>
-          <a:chExt cx="0" cy="0"/>
-        </a:xfrm>
-      </p:grpSpPr>
-      <p:sp>
-        <p:nvSpPr>
-          <p:cNvPr id="5" name="Date Placeholder 4">
-            <a:extLst>
-              <a:ext uri="{FF2B5EF4-FFF2-40B4-BE49-F238E27FC236}">
-                <a16:creationId xmlns:a16="http://schemas.microsoft.com/office/drawing/2014/main" id="{985F3433-3055-4279-A232-CDB35C481677}"/>
-              </a:ext>
-            </a:extLst>
-          </p:cNvPr>
-          <p:cNvSpPr>
-            <a:spLocks noGrp="1"/>
-          </p:cNvSpPr>
-          <p:nvPr>
-            <p:ph type="dt" sz="half" idx="10"/>
-          </p:nvPr>
-        </p:nvSpPr>
-        <p:spPr/>
-        <p:txBody>
-          <a:bodyPr/>
-          <a:lstStyle/>
-          <a:p>
-            <a:fld id="{7B272C57-2FA0-4A9D-99A4-6F756B65018B}" type="datetimeFigureOut">
-              <a:rPr lang="en-US" smtClean="0"/>
-              <a:t>1/7/2022</a:t>
-            </a:fld>
-            <a:endParaRPr lang="en-US"/>
-          </a:p>
-        </p:txBody>
-      </p:sp>
-      <p:sp>
-        <p:nvSpPr>
-          <p:cNvPr id="6" name="Footer Placeholder 5">
-            <a:extLst>
-              <a:ext uri="{FF2B5EF4-FFF2-40B4-BE49-F238E27FC236}">
-                <a16:creationId xmlns:a16="http://schemas.microsoft.com/office/drawing/2014/main" id="{C4190A63-5D67-4FD5-97FD-79F7445B6A2E}"/>
-              </a:ext>
-            </a:extLst>
-          </p:cNvPr>
-          <p:cNvSpPr>
-            <a:spLocks noGrp="1"/>
-          </p:cNvSpPr>
-          <p:nvPr>
-            <p:ph type="ftr" sz="quarter" idx="11"/>
-          </p:nvPr>
-        </p:nvSpPr>
-        <p:spPr/>
-        <p:txBody>
-          <a:bodyPr/>
-          <a:lstStyle/>
-          <a:p>
-            <a:endParaRPr lang="en-US"/>
-          </a:p>
-        </p:txBody>
-      </p:sp>
-      <p:sp>
-        <p:nvSpPr>
-          <p:cNvPr id="7" name="Slide Number Placeholder 6">
-            <a:extLst>
-              <a:ext uri="{FF2B5EF4-FFF2-40B4-BE49-F238E27FC236}">
-                <a16:creationId xmlns:a16="http://schemas.microsoft.com/office/drawing/2014/main" id="{D2687DAE-A442-4DC3-8550-20F58B781EC7}"/>
-              </a:ext>
-            </a:extLst>
-          </p:cNvPr>
-          <p:cNvSpPr>
-            <a:spLocks noGrp="1"/>
-          </p:cNvSpPr>
-          <p:nvPr>
-            <p:ph type="sldNum" sz="quarter" idx="12"/>
-          </p:nvPr>
-        </p:nvSpPr>
-        <p:spPr/>
-        <p:txBody>
-          <a:bodyPr/>
-          <a:lstStyle/>
-          <a:p>
-            <a:fld id="{C064A79B-B315-413E-88BB-EFE0B5D603D0}" type="slidenum">
-              <a:rPr lang="en-US" smtClean="0"/>
-              <a:t>‹#›</a:t>
-            </a:fld>
-            <a:endParaRPr lang="en-US"/>
-          </a:p>
-        </p:txBody>
-      </p:sp>
-      <p:sp>
-        <p:nvSpPr>
-          <p:cNvPr id="9" name="Title 1">
-            <a:extLst>
-              <a:ext uri="{FF2B5EF4-FFF2-40B4-BE49-F238E27FC236}">
-                <a16:creationId xmlns:a16="http://schemas.microsoft.com/office/drawing/2014/main" id="{177E17F1-D3B2-42A6-9982-8788655386CF}"/>
-              </a:ext>
-            </a:extLst>
-          </p:cNvPr>
-          <p:cNvSpPr>
-            <a:spLocks noGrp="1"/>
-          </p:cNvSpPr>
-          <p:nvPr>
-            <p:ph type="title"/>
-          </p:nvPr>
-        </p:nvSpPr>
-        <p:spPr>
-          <a:xfrm>
-            <a:off x="0" y="0"/>
-            <a:ext cx="12192000" cy="1013635"/>
-          </a:xfrm>
-          <a:solidFill>
-            <a:srgbClr val="2E3640"/>
-          </a:solidFill>
-        </p:spPr>
-        <p:txBody>
-          <a:bodyPr/>
-          <a:lstStyle>
-            <a:lvl1pPr>
-              <a:defRPr lang="en-US" dirty="0"/>
-            </a:lvl1pPr>
-          </a:lstStyle>
-          <a:p>
-            <a:r>
-              <a:rPr lang="en-US" dirty="0"/>
-              <a:t>Click to edit Master title style</a:t>
-            </a:r>
-          </a:p>
-        </p:txBody>
-      </p:sp>
-      <p:sp>
-        <p:nvSpPr>
-          <p:cNvPr id="10" name="Content Placeholder 2">
-            <a:extLst>
-              <a:ext uri="{FF2B5EF4-FFF2-40B4-BE49-F238E27FC236}">
-                <a16:creationId xmlns:a16="http://schemas.microsoft.com/office/drawing/2014/main" id="{F1A58CC4-526C-4991-898F-C0879D5343E8}"/>
-              </a:ext>
-            </a:extLst>
-          </p:cNvPr>
-          <p:cNvSpPr>
-            <a:spLocks noGrp="1"/>
-          </p:cNvSpPr>
-          <p:nvPr>
-            <p:ph sz="half" idx="1"/>
-          </p:nvPr>
-        </p:nvSpPr>
-        <p:spPr>
-          <a:xfrm>
-            <a:off x="250521" y="1205547"/>
-            <a:ext cx="5769279" cy="4446906"/>
-          </a:xfrm>
-        </p:spPr>
-        <p:txBody>
-          <a:bodyPr/>
-          <a:lstStyle/>
-          <a:p>
-            <a:pPr lvl="0"/>
-            <a:r>
-              <a:rPr lang="en-US"/>
-              <a:t>Click to edit Master text styles</a:t>
-            </a:r>
-          </a:p>
-          <a:p>
-            <a:pPr lvl="1"/>
-            <a:r>
-              <a:rPr lang="en-US"/>
-              <a:t>Second level</a:t>
-            </a:r>
-          </a:p>
-          <a:p>
-            <a:pPr lvl="2"/>
-            <a:r>
-              <a:rPr lang="en-US"/>
-              <a:t>Third level</a:t>
-            </a:r>
-          </a:p>
-          <a:p>
-            <a:pPr lvl="3"/>
-            <a:r>
-              <a:rPr lang="en-US"/>
-              <a:t>Fourth level</a:t>
-            </a:r>
-          </a:p>
-          <a:p>
-            <a:pPr lvl="4"/>
-            <a:r>
-              <a:rPr lang="en-US"/>
-              <a:t>Fifth level</a:t>
-            </a:r>
-          </a:p>
-        </p:txBody>
-      </p:sp>
-      <p:sp>
-        <p:nvSpPr>
-          <p:cNvPr id="11" name="Content Placeholder 3">
-            <a:extLst>
-              <a:ext uri="{FF2B5EF4-FFF2-40B4-BE49-F238E27FC236}">
-                <a16:creationId xmlns:a16="http://schemas.microsoft.com/office/drawing/2014/main" id="{CB008E43-F727-4C47-9855-9440A412ACCB}"/>
-              </a:ext>
-            </a:extLst>
-          </p:cNvPr>
-          <p:cNvSpPr>
-            <a:spLocks noGrp="1"/>
-          </p:cNvSpPr>
-          <p:nvPr>
-            <p:ph sz="half" idx="2"/>
-          </p:nvPr>
-        </p:nvSpPr>
-        <p:spPr>
-          <a:xfrm>
-            <a:off x="6172199" y="1205548"/>
-            <a:ext cx="5727527" cy="5021670"/>
-          </a:xfrm>
-        </p:spPr>
-        <p:txBody>
-          <a:bodyPr/>
-          <a:lstStyle/>
-          <a:p>
-            <a:pPr lvl="0"/>
-            <a:r>
-              <a:rPr lang="en-US"/>
-              <a:t>Click to edit Master text styles</a:t>
-            </a:r>
-          </a:p>
-          <a:p>
-            <a:pPr lvl="1"/>
-            <a:r>
-              <a:rPr lang="en-US"/>
-              <a:t>Second level</a:t>
-            </a:r>
-          </a:p>
-          <a:p>
-            <a:pPr lvl="2"/>
-            <a:r>
-              <a:rPr lang="en-US"/>
-              <a:t>Third level</a:t>
-            </a:r>
-          </a:p>
-          <a:p>
-            <a:pPr lvl="3"/>
-            <a:r>
-              <a:rPr lang="en-US"/>
-              <a:t>Fourth level</a:t>
-            </a:r>
-          </a:p>
-          <a:p>
-            <a:pPr lvl="4"/>
-            <a:r>
-              <a:rPr lang="en-US"/>
-              <a:t>Fifth level</a:t>
-            </a:r>
-          </a:p>
-        </p:txBody>
-      </p:sp>
-      <p:sp>
-        <p:nvSpPr>
-          <p:cNvPr id="3" name="Text Placeholder 2">
-            <a:extLst>
-              <a:ext uri="{FF2B5EF4-FFF2-40B4-BE49-F238E27FC236}">
-                <a16:creationId xmlns:a16="http://schemas.microsoft.com/office/drawing/2014/main" id="{B6810FF5-0B9C-4441-B73D-B10146FB8996}"/>
-              </a:ext>
-            </a:extLst>
-          </p:cNvPr>
-          <p:cNvSpPr>
-            <a:spLocks noGrp="1"/>
-          </p:cNvSpPr>
-          <p:nvPr>
-            <p:ph type="body" sz="quarter" idx="13"/>
-          </p:nvPr>
-        </p:nvSpPr>
-        <p:spPr>
-          <a:xfrm>
-            <a:off x="250521" y="5781584"/>
-            <a:ext cx="5769279" cy="445634"/>
-          </a:xfrm>
-        </p:spPr>
-        <p:txBody>
-          <a:bodyPr/>
-          <a:lstStyle>
-            <a:lvl1pPr marL="0" indent="0">
-              <a:buFont typeface="Arial" panose="020B0604020202020204" pitchFamily="34" charset="0"/>
-              <a:buNone/>
-              <a:defRPr sz="1200"/>
-            </a:lvl1pPr>
-            <a:lvl2pPr marL="457200" indent="0">
-              <a:buFont typeface="Arial" panose="020B0604020202020204" pitchFamily="34" charset="0"/>
-              <a:buNone/>
-              <a:defRPr sz="1100"/>
-            </a:lvl2pPr>
-            <a:lvl3pPr marL="914400" indent="0">
-              <a:buFont typeface="Arial" panose="020B0604020202020204" pitchFamily="34" charset="0"/>
-              <a:buNone/>
-              <a:defRPr sz="1050"/>
-            </a:lvl3pPr>
-            <a:lvl4pPr marL="1371600" indent="0">
-              <a:buFont typeface="Arial" panose="020B0604020202020204" pitchFamily="34" charset="0"/>
-              <a:buNone/>
-              <a:defRPr sz="1000"/>
-            </a:lvl4pPr>
-            <a:lvl5pPr marL="1828800" indent="0">
-              <a:buFont typeface="Arial" panose="020B0604020202020204" pitchFamily="34" charset="0"/>
-              <a:buNone/>
-              <a:defRPr sz="1000"/>
-            </a:lvl5pPr>
-          </a:lstStyle>
-          <a:p>
-            <a:pPr lvl="0"/>
-            <a:r>
-              <a:rPr lang="en-US" dirty="0"/>
-              <a:t>Click to edit Master text styles</a:t>
-            </a:r>
-          </a:p>
-          <a:p>
-            <a:pPr lvl="1"/>
-            <a:r>
-              <a:rPr lang="en-US" dirty="0"/>
-              <a:t>Second level</a:t>
-            </a:r>
-          </a:p>
-          <a:p>
-            <a:pPr lvl="2"/>
-            <a:r>
-              <a:rPr lang="en-US" dirty="0"/>
-              <a:t>Third level</a:t>
-            </a:r>
-          </a:p>
-          <a:p>
-            <a:pPr lvl="3"/>
-            <a:r>
-              <a:rPr lang="en-US" dirty="0"/>
-              <a:t>Fourth level</a:t>
-            </a:r>
-          </a:p>
-          <a:p>
-            <a:pPr lvl="4"/>
-            <a:r>
-              <a:rPr lang="en-US" dirty="0"/>
-              <a:t>Fifth level</a:t>
-            </a:r>
-            <a:endParaRPr lang="en-CH" dirty="0"/>
-          </a:p>
-        </p:txBody>
-      </p:sp>
-    </p:spTree>
-    <p:extLst>
-      <p:ext uri="{BB962C8B-B14F-4D97-AF65-F5344CB8AC3E}">
-        <p14:creationId xmlns:p14="http://schemas.microsoft.com/office/powerpoint/2010/main" val="3059227006"/>
       </p:ext>
     </p:extLst>
   </p:cSld>
@@ -5113,7 +5416,7 @@
           <a:p>
             <a:fld id="{7B272C57-2FA0-4A9D-99A4-6F756B65018B}" type="datetimeFigureOut">
               <a:rPr lang="en-US" smtClean="0"/>
-              <a:t>1/7/2022</a:t>
+              <a:t>5/17/2022</a:t>
             </a:fld>
             <a:endParaRPr lang="en-US"/>
           </a:p>
@@ -5224,7 +5527,7 @@
           <p:nvPr userDrawn="1"/>
         </p:nvPicPr>
         <p:blipFill>
-          <a:blip r:embed="rId19"/>
+          <a:blip r:embed="rId20"/>
           <a:stretch>
             <a:fillRect/>
           </a:stretch>
@@ -5255,16 +5558,17 @@
     <p:sldLayoutId id="2147483665" r:id="rId5"/>
     <p:sldLayoutId id="2147483651" r:id="rId6"/>
     <p:sldLayoutId id="2147483652" r:id="rId7"/>
-    <p:sldLayoutId id="2147483661" r:id="rId8"/>
-    <p:sldLayoutId id="2147483662" r:id="rId9"/>
-    <p:sldLayoutId id="2147483663" r:id="rId10"/>
-    <p:sldLayoutId id="2147483653" r:id="rId11"/>
-    <p:sldLayoutId id="2147483654" r:id="rId12"/>
-    <p:sldLayoutId id="2147483655" r:id="rId13"/>
-    <p:sldLayoutId id="2147483656" r:id="rId14"/>
-    <p:sldLayoutId id="2147483657" r:id="rId15"/>
-    <p:sldLayoutId id="2147483658" r:id="rId16"/>
-    <p:sldLayoutId id="2147483659" r:id="rId17"/>
+    <p:sldLayoutId id="2147483666" r:id="rId8"/>
+    <p:sldLayoutId id="2147483661" r:id="rId9"/>
+    <p:sldLayoutId id="2147483662" r:id="rId10"/>
+    <p:sldLayoutId id="2147483663" r:id="rId11"/>
+    <p:sldLayoutId id="2147483653" r:id="rId12"/>
+    <p:sldLayoutId id="2147483654" r:id="rId13"/>
+    <p:sldLayoutId id="2147483655" r:id="rId14"/>
+    <p:sldLayoutId id="2147483656" r:id="rId15"/>
+    <p:sldLayoutId id="2147483657" r:id="rId16"/>
+    <p:sldLayoutId id="2147483658" r:id="rId17"/>
+    <p:sldLayoutId id="2147483659" r:id="rId18"/>
   </p:sldLayoutIdLst>
   <p:txStyles>
     <p:titleStyle>

</xml_diff>